<commit_message>
before switch to plotly
</commit_message>
<xml_diff>
--- a/markdown/pptx_template.pptx
+++ b/markdown/pptx_template.pptx
@@ -1,13 +1,26 @@
 
 <file path=ppt/presentation.xml><?xml version="1.0" encoding="utf-8"?>
-<p:presentation xmlns:a="http://schemas.openxmlformats.org/drawingml/2006/main" xmlns:r="http://schemas.openxmlformats.org/officeDocument/2006/relationships" xmlns:p="http://schemas.openxmlformats.org/presentationml/2006/main" showSpecialPlsOnTitleSld="0" saveSubsetFonts="1" autoCompressPictures="0">
+<p:presentation xmlns:a="http://schemas.openxmlformats.org/drawingml/2006/main" xmlns:r="http://schemas.openxmlformats.org/officeDocument/2006/relationships" xmlns:p="http://schemas.openxmlformats.org/presentationml/2006/main" saveSubsetFonts="1" autoCompressPictures="0">
   <p:sldMasterIdLst>
     <p:sldMasterId id="2147483648" r:id="rId1"/>
   </p:sldMasterIdLst>
   <p:sldIdLst>
     <p:sldId id="256" r:id="rId2"/>
-    <p:sldId id="261" r:id="rId3"/>
-    <p:sldId id="263" r:id="rId4"/>
+    <p:sldId id="257" r:id="rId3"/>
+    <p:sldId id="258" r:id="rId4"/>
+    <p:sldId id="259" r:id="rId5"/>
+    <p:sldId id="260" r:id="rId6"/>
+    <p:sldId id="261" r:id="rId7"/>
+    <p:sldId id="262" r:id="rId8"/>
+    <p:sldId id="263" r:id="rId9"/>
+    <p:sldId id="264" r:id="rId10"/>
+    <p:sldId id="265" r:id="rId11"/>
+    <p:sldId id="266" r:id="rId12"/>
+    <p:sldId id="267" r:id="rId13"/>
+    <p:sldId id="268" r:id="rId14"/>
+    <p:sldId id="269" r:id="rId15"/>
+    <p:sldId id="270" r:id="rId16"/>
+    <p:sldId id="271" r:id="rId17"/>
   </p:sldIdLst>
   <p:sldSz cx="9144000" cy="5143500" type="screen16x9"/>
   <p:notesSz cx="6858000" cy="9144000"/>
@@ -125,78 +138,9 @@
 </p:presentation>
 </file>
 
-<file path=ppt/revisionInfo.xml><?xml version="1.0" encoding="utf-8"?>
-<p1510:revInfo xmlns:a="http://schemas.openxmlformats.org/drawingml/2006/main" xmlns:r="http://schemas.openxmlformats.org/officeDocument/2006/relationships" xmlns:p1510="http://schemas.microsoft.com/office/powerpoint/2015/10/main">
-  <p1510:revLst>
-    <p1510:client id="{6ECE8AED-25DA-8747-AF5B-51B3A17873D2}" v="3" dt="2021-04-21T17:13:58.953"/>
-  </p1510:revLst>
-</p1510:revInfo>
-</file>
-
-<file path=ppt/changesInfos/changesInfo1.xml><?xml version="1.0" encoding="utf-8"?>
-<pc:chgInfo xmlns:a="http://schemas.openxmlformats.org/drawingml/2006/main" xmlns:r="http://schemas.openxmlformats.org/officeDocument/2006/relationships" xmlns:ac="http://schemas.microsoft.com/office/drawing/2013/main/command" xmlns:pc="http://schemas.microsoft.com/office/powerpoint/2013/main/command">
-  <pc:docChgLst>
-    <pc:chgData name="Kenechukwu Nwosu" userId="bfe78da84aa7621c" providerId="LiveId" clId="{6ECE8AED-25DA-8747-AF5B-51B3A17873D2}"/>
-    <pc:docChg chg="custSel modMainMaster">
-      <pc:chgData name="Kenechukwu Nwosu" userId="bfe78da84aa7621c" providerId="LiveId" clId="{6ECE8AED-25DA-8747-AF5B-51B3A17873D2}" dt="2021-04-21T17:19:02.685" v="4" actId="478"/>
-      <pc:docMkLst>
-        <pc:docMk/>
-      </pc:docMkLst>
-      <pc:sldMasterChg chg="delSp modSp mod modSldLayout sldLayoutOrd">
-        <pc:chgData name="Kenechukwu Nwosu" userId="bfe78da84aa7621c" providerId="LiveId" clId="{6ECE8AED-25DA-8747-AF5B-51B3A17873D2}" dt="2021-04-21T17:19:02.685" v="4" actId="478"/>
-        <pc:sldMasterMkLst>
-          <pc:docMk/>
-          <pc:sldMasterMk cId="3676200875" sldId="2147483648"/>
-        </pc:sldMasterMkLst>
-        <pc:spChg chg="mod">
-          <ac:chgData name="Kenechukwu Nwosu" userId="bfe78da84aa7621c" providerId="LiveId" clId="{6ECE8AED-25DA-8747-AF5B-51B3A17873D2}" dt="2021-04-21T17:13:52.484" v="2" actId="207"/>
-          <ac:spMkLst>
-            <pc:docMk/>
-            <pc:sldMasterMk cId="3676200875" sldId="2147483648"/>
-            <ac:spMk id="2" creationId="{00000000-0000-0000-0000-000000000000}"/>
-          </ac:spMkLst>
-        </pc:spChg>
-        <pc:spChg chg="mod">
-          <ac:chgData name="Kenechukwu Nwosu" userId="bfe78da84aa7621c" providerId="LiveId" clId="{6ECE8AED-25DA-8747-AF5B-51B3A17873D2}" dt="2021-04-21T17:13:58.953" v="3" actId="207"/>
-          <ac:spMkLst>
-            <pc:docMk/>
-            <pc:sldMasterMk cId="3676200875" sldId="2147483648"/>
-            <ac:spMk id="3" creationId="{00000000-0000-0000-0000-000000000000}"/>
-          </ac:spMkLst>
-        </pc:spChg>
-        <pc:picChg chg="del">
-          <ac:chgData name="Kenechukwu Nwosu" userId="bfe78da84aa7621c" providerId="LiveId" clId="{6ECE8AED-25DA-8747-AF5B-51B3A17873D2}" dt="2021-04-21T17:19:02.685" v="4" actId="478"/>
-          <ac:picMkLst>
-            <pc:docMk/>
-            <pc:sldMasterMk cId="3676200875" sldId="2147483648"/>
-            <ac:picMk id="11" creationId="{AF2513A8-078E-184B-A410-BE82E6A1BE7D}"/>
-          </ac:picMkLst>
-        </pc:picChg>
-        <pc:sldLayoutChg chg="ord">
-          <pc:chgData name="Kenechukwu Nwosu" userId="bfe78da84aa7621c" providerId="LiveId" clId="{6ECE8AED-25DA-8747-AF5B-51B3A17873D2}" dt="2021-04-20T18:15:58.826" v="1" actId="20578"/>
-          <pc:sldLayoutMkLst>
-            <pc:docMk/>
-            <pc:sldMasterMk cId="3676200875" sldId="2147483648"/>
-            <pc:sldLayoutMk cId="338346009" sldId="2147483650"/>
-          </pc:sldLayoutMkLst>
-        </pc:sldLayoutChg>
-        <pc:sldLayoutChg chg="ord">
-          <pc:chgData name="Kenechukwu Nwosu" userId="bfe78da84aa7621c" providerId="LiveId" clId="{6ECE8AED-25DA-8747-AF5B-51B3A17873D2}" dt="2021-04-20T18:15:53.445" v="0" actId="20578"/>
-          <pc:sldLayoutMkLst>
-            <pc:docMk/>
-            <pc:sldMasterMk cId="3676200875" sldId="2147483648"/>
-            <pc:sldLayoutMk cId="1073069076" sldId="2147483651"/>
-          </pc:sldLayoutMkLst>
-        </pc:sldLayoutChg>
-      </pc:sldMasterChg>
-    </pc:docChg>
-  </pc:docChgLst>
-</pc:chgInfo>
-</file>
-
 <file path=ppt/slideLayouts/slideLayout1.xml><?xml version="1.0" encoding="utf-8"?>
-<p:sldLayout xmlns:a="http://schemas.openxmlformats.org/drawingml/2006/main" xmlns:r="http://schemas.openxmlformats.org/officeDocument/2006/relationships" xmlns:p="http://schemas.openxmlformats.org/presentationml/2006/main" type="secHead" preserve="1">
-  <p:cSld name="Section Header">
+<p:sldLayout xmlns:a="http://schemas.openxmlformats.org/drawingml/2006/main" xmlns:r="http://schemas.openxmlformats.org/officeDocument/2006/relationships" xmlns:p="http://schemas.openxmlformats.org/presentationml/2006/main" type="title" preserve="1">
+  <p:cSld name="Title Slide">
     <p:spTree>
       <p:nvGrpSpPr>
         <p:cNvPr id="1" name=""/>
@@ -211,29 +155,54 @@
           <a:chExt cx="0" cy="0"/>
         </a:xfrm>
       </p:grpSpPr>
-      <p:sp>
-        <p:nvSpPr>
-          <p:cNvPr id="2" name="Title 1"/>
-          <p:cNvSpPr>
-            <a:spLocks noGrp="1"/>
-          </p:cNvSpPr>
-          <p:nvPr>
-            <p:ph type="title"/>
-          </p:nvPr>
-        </p:nvSpPr>
+      <p:pic>
+        <p:nvPicPr>
+          <p:cNvPr id="7" name="Picture 6" descr="A picture containing outdoor, day&#10;&#10;Description automatically generated">
+            <a:extLst>
+              <a:ext uri="{FF2B5EF4-FFF2-40B4-BE49-F238E27FC236}">
+                <a16:creationId xmlns:a16="http://schemas.microsoft.com/office/drawing/2014/main" id="{72D31F92-B5F5-984B-8163-C46BAD9F975D}"/>
+              </a:ext>
+            </a:extLst>
+          </p:cNvPr>
+          <p:cNvPicPr>
+            <a:picLocks noChangeAspect="1"/>
+          </p:cNvPicPr>
+          <p:nvPr userDrawn="1"/>
+        </p:nvPicPr>
+        <p:blipFill rotWithShape="1">
+          <a:blip r:embed="rId2"/>
+          <a:srcRect t="54444"/>
+          <a:stretch/>
+        </p:blipFill>
         <p:spPr>
           <a:xfrm>
-            <a:off x="722313" y="3305176"/>
-            <a:ext cx="7772400" cy="1021556"/>
+            <a:off x="-1" y="-1"/>
+            <a:ext cx="9144001" cy="4706343"/>
+          </a:xfrm>
+          <a:prstGeom prst="rect">
+            <a:avLst/>
+          </a:prstGeom>
+        </p:spPr>
+      </p:pic>
+      <p:sp>
+        <p:nvSpPr>
+          <p:cNvPr id="2" name="Title 1"/>
+          <p:cNvSpPr>
+            <a:spLocks noGrp="1"/>
+          </p:cNvSpPr>
+          <p:nvPr>
+            <p:ph type="ctrTitle"/>
+          </p:nvPr>
+        </p:nvSpPr>
+        <p:spPr>
+          <a:xfrm>
+            <a:off x="685800" y="1597819"/>
+            <a:ext cx="7772400" cy="1102519"/>
           </a:xfrm>
         </p:spPr>
         <p:txBody>
-          <a:bodyPr anchor="t"/>
-          <a:lstStyle>
-            <a:lvl1pPr algn="l">
-              <a:defRPr sz="3000" b="1" cap="all"/>
-            </a:lvl1pPr>
-          </a:lstStyle>
+          <a:bodyPr/>
+          <a:lstStyle/>
           <a:p>
             <a:r>
               <a:rPr lang="en-US"/>
@@ -244,26 +213,26 @@
       </p:sp>
       <p:sp>
         <p:nvSpPr>
-          <p:cNvPr id="3" name="Text Placeholder 2"/>
-          <p:cNvSpPr>
-            <a:spLocks noGrp="1"/>
-          </p:cNvSpPr>
-          <p:nvPr>
-            <p:ph type="body" idx="1"/>
+          <p:cNvPr id="3" name="Subtitle 2"/>
+          <p:cNvSpPr>
+            <a:spLocks noGrp="1"/>
+          </p:cNvSpPr>
+          <p:nvPr>
+            <p:ph type="subTitle" idx="1"/>
           </p:nvPr>
         </p:nvSpPr>
         <p:spPr>
           <a:xfrm>
-            <a:off x="722313" y="2180035"/>
-            <a:ext cx="7772400" cy="1125140"/>
+            <a:off x="1371600" y="2914650"/>
+            <a:ext cx="6400800" cy="1314450"/>
           </a:xfrm>
         </p:spPr>
         <p:txBody>
-          <a:bodyPr anchor="b"/>
+          <a:bodyPr/>
           <a:lstStyle>
-            <a:lvl1pPr marL="0" indent="0">
-              <a:buNone/>
-              <a:defRPr sz="1500">
+            <a:lvl1pPr marL="0" indent="0" algn="ctr">
+              <a:buNone/>
+              <a:defRPr>
                 <a:solidFill>
                   <a:schemeClr val="tx1">
                     <a:tint val="75000"/>
@@ -271,9 +240,9 @@
                 </a:solidFill>
               </a:defRPr>
             </a:lvl1pPr>
-            <a:lvl2pPr marL="342900" indent="0">
-              <a:buNone/>
-              <a:defRPr sz="1350">
+            <a:lvl2pPr marL="342900" indent="0" algn="ctr">
+              <a:buNone/>
+              <a:defRPr>
                 <a:solidFill>
                   <a:schemeClr val="tx1">
                     <a:tint val="75000"/>
@@ -281,9 +250,9 @@
                 </a:solidFill>
               </a:defRPr>
             </a:lvl2pPr>
-            <a:lvl3pPr marL="685800" indent="0">
-              <a:buNone/>
-              <a:defRPr sz="1200">
+            <a:lvl3pPr marL="685800" indent="0" algn="ctr">
+              <a:buNone/>
+              <a:defRPr>
                 <a:solidFill>
                   <a:schemeClr val="tx1">
                     <a:tint val="75000"/>
@@ -291,9 +260,9 @@
                 </a:solidFill>
               </a:defRPr>
             </a:lvl3pPr>
-            <a:lvl4pPr marL="1028700" indent="0">
-              <a:buNone/>
-              <a:defRPr sz="1050">
+            <a:lvl4pPr marL="1028700" indent="0" algn="ctr">
+              <a:buNone/>
+              <a:defRPr>
                 <a:solidFill>
                   <a:schemeClr val="tx1">
                     <a:tint val="75000"/>
@@ -301,9 +270,9 @@
                 </a:solidFill>
               </a:defRPr>
             </a:lvl4pPr>
-            <a:lvl5pPr marL="1371600" indent="0">
-              <a:buNone/>
-              <a:defRPr sz="1050">
+            <a:lvl5pPr marL="1371600" indent="0" algn="ctr">
+              <a:buNone/>
+              <a:defRPr>
                 <a:solidFill>
                   <a:schemeClr val="tx1">
                     <a:tint val="75000"/>
@@ -311,9 +280,9 @@
                 </a:solidFill>
               </a:defRPr>
             </a:lvl5pPr>
-            <a:lvl6pPr marL="1714500" indent="0">
-              <a:buNone/>
-              <a:defRPr sz="1050">
+            <a:lvl6pPr marL="1714500" indent="0" algn="ctr">
+              <a:buNone/>
+              <a:defRPr>
                 <a:solidFill>
                   <a:schemeClr val="tx1">
                     <a:tint val="75000"/>
@@ -321,9 +290,9 @@
                 </a:solidFill>
               </a:defRPr>
             </a:lvl6pPr>
-            <a:lvl7pPr marL="2057400" indent="0">
-              <a:buNone/>
-              <a:defRPr sz="1050">
+            <a:lvl7pPr marL="2057400" indent="0" algn="ctr">
+              <a:buNone/>
+              <a:defRPr>
                 <a:solidFill>
                   <a:schemeClr val="tx1">
                     <a:tint val="75000"/>
@@ -331,9 +300,9 @@
                 </a:solidFill>
               </a:defRPr>
             </a:lvl7pPr>
-            <a:lvl8pPr marL="2400300" indent="0">
-              <a:buNone/>
-              <a:defRPr sz="1050">
+            <a:lvl8pPr marL="2400300" indent="0" algn="ctr">
+              <a:buNone/>
+              <a:defRPr>
                 <a:solidFill>
                   <a:schemeClr val="tx1">
                     <a:tint val="75000"/>
@@ -341,9 +310,9 @@
                 </a:solidFill>
               </a:defRPr>
             </a:lvl8pPr>
-            <a:lvl9pPr marL="2743200" indent="0">
-              <a:buNone/>
-              <a:defRPr sz="1050">
+            <a:lvl9pPr marL="2743200" indent="0" algn="ctr">
+              <a:buNone/>
+              <a:defRPr>
                 <a:solidFill>
                   <a:schemeClr val="tx1">
                     <a:tint val="75000"/>
@@ -353,10 +322,9 @@
             </a:lvl9pPr>
           </a:lstStyle>
           <a:p>
-            <a:pPr lvl="0"/>
-            <a:r>
-              <a:rPr lang="en-US"/>
-              <a:t>Click to edit Master text styles</a:t>
+            <a:r>
+              <a:rPr lang="en-US"/>
+              <a:t>Click to edit Master subtitle style</a:t>
             </a:r>
           </a:p>
         </p:txBody>
@@ -376,9 +344,9 @@
           <a:bodyPr/>
           <a:lstStyle/>
           <a:p>
-            <a:fld id="{BC94A024-7C88-BB4F-963A-0AE4C1313A4D}" type="datetime1">
-              <a:rPr lang="de-CH" smtClean="0"/>
-              <a:t>21.04.21</a:t>
+            <a:fld id="{241EB5C9-1307-BA42-ABA2-0BC069CD8E7F}" type="datetimeFigureOut">
+              <a:rPr lang="en-US" smtClean="0"/>
+              <a:t>4/23/21</a:t>
             </a:fld>
             <a:endParaRPr lang="en-US"/>
           </a:p>
@@ -429,7 +397,7 @@
     </p:spTree>
     <p:extLst>
       <p:ext uri="{BB962C8B-B14F-4D97-AF65-F5344CB8AC3E}">
-        <p14:creationId xmlns:p14="http://schemas.microsoft.com/office/powerpoint/2010/main" val="1073069076"/>
+        <p14:creationId xmlns:p14="http://schemas.microsoft.com/office/powerpoint/2010/main" val="1444357513"/>
       </p:ext>
     </p:extLst>
   </p:cSld>
@@ -544,9 +512,9 @@
           <a:bodyPr/>
           <a:lstStyle/>
           <a:p>
-            <a:fld id="{B771E26A-63A1-D644-BABA-AEFB031B22C6}" type="datetime1">
-              <a:rPr lang="de-CH" smtClean="0"/>
-              <a:t>21.04.21</a:t>
+            <a:fld id="{241EB5C9-1307-BA42-ABA2-0BC069CD8E7F}" type="datetimeFigureOut">
+              <a:rPr lang="en-US" smtClean="0"/>
+              <a:t>4/23/21</a:t>
             </a:fld>
             <a:endParaRPr lang="en-US"/>
           </a:p>
@@ -722,9 +690,9 @@
           <a:bodyPr/>
           <a:lstStyle/>
           <a:p>
-            <a:fld id="{11D2F6B8-4DF8-9F42-B85A-D48730FB9EC4}" type="datetime1">
-              <a:rPr lang="de-CH" smtClean="0"/>
-              <a:t>21.04.21</a:t>
+            <a:fld id="{241EB5C9-1307-BA42-ABA2-0BC069CD8E7F}" type="datetimeFigureOut">
+              <a:rPr lang="en-US" smtClean="0"/>
+              <a:t>4/23/21</a:t>
             </a:fld>
             <a:endParaRPr lang="en-US"/>
           </a:p>
@@ -890,9 +858,9 @@
           <a:bodyPr/>
           <a:lstStyle/>
           <a:p>
-            <a:fld id="{D5698881-D495-0549-BBE8-DA3EEA3E36AF}" type="datetime1">
-              <a:rPr lang="de-CH" smtClean="0"/>
-              <a:t>21.04.21</a:t>
+            <a:fld id="{241EB5C9-1307-BA42-ABA2-0BC069CD8E7F}" type="datetimeFigureOut">
+              <a:rPr lang="en-US" smtClean="0"/>
+              <a:t>4/23/21</a:t>
             </a:fld>
             <a:endParaRPr lang="en-US"/>
           </a:p>
@@ -954,8 +922,8 @@
 </file>
 
 <file path=ppt/slideLayouts/slideLayout3.xml><?xml version="1.0" encoding="utf-8"?>
-<p:sldLayout xmlns:a="http://schemas.openxmlformats.org/drawingml/2006/main" xmlns:r="http://schemas.openxmlformats.org/officeDocument/2006/relationships" xmlns:p="http://schemas.openxmlformats.org/presentationml/2006/main" type="title" preserve="1">
-  <p:cSld name="Title Slide">
+<p:sldLayout xmlns:a="http://schemas.openxmlformats.org/drawingml/2006/main" xmlns:r="http://schemas.openxmlformats.org/officeDocument/2006/relationships" xmlns:p="http://schemas.openxmlformats.org/presentationml/2006/main" type="secHead" preserve="1">
+  <p:cSld name="Section Header">
     <p:spTree>
       <p:nvGrpSpPr>
         <p:cNvPr id="1" name=""/>
@@ -972,10 +940,10 @@
       </p:grpSpPr>
       <p:pic>
         <p:nvPicPr>
-          <p:cNvPr id="8" name="Picture 7" descr="A picture containing outdoor, day&#10;&#10;Description automatically generated">
+          <p:cNvPr id="7" name="Picture 6" descr="A picture containing outdoor, day&#10;&#10;Description automatically generated">
             <a:extLst>
               <a:ext uri="{FF2B5EF4-FFF2-40B4-BE49-F238E27FC236}">
-                <a16:creationId xmlns:a16="http://schemas.microsoft.com/office/drawing/2014/main" id="{EF9F929A-BFBA-A342-9D97-5B08564C416D}"/>
+                <a16:creationId xmlns:a16="http://schemas.microsoft.com/office/drawing/2014/main" id="{ACCBD482-3FDB-7045-AC17-5B2D1A747079}"/>
               </a:ext>
             </a:extLst>
           </p:cNvPr>
@@ -991,8 +959,8 @@
         </p:blipFill>
         <p:spPr>
           <a:xfrm>
-            <a:off x="-1" y="0"/>
-            <a:ext cx="9225023" cy="4594860"/>
+            <a:off x="-1" y="-1"/>
+            <a:ext cx="9144001" cy="4706343"/>
           </a:xfrm>
           <a:prstGeom prst="rect">
             <a:avLst/>
@@ -1006,21 +974,25 @@
             <a:spLocks noGrp="1"/>
           </p:cNvSpPr>
           <p:nvPr>
-            <p:ph type="ctrTitle"/>
+            <p:ph type="title"/>
           </p:nvPr>
         </p:nvSpPr>
         <p:spPr>
           <a:xfrm>
-            <a:off x="685800" y="1597819"/>
-            <a:ext cx="7772400" cy="1102519"/>
+            <a:off x="722313" y="3305176"/>
+            <a:ext cx="7772400" cy="1021556"/>
           </a:xfrm>
         </p:spPr>
         <p:txBody>
-          <a:bodyPr/>
-          <a:lstStyle/>
-          <a:p>
-            <a:r>
-              <a:rPr lang="en-US"/>
+          <a:bodyPr anchor="t"/>
+          <a:lstStyle>
+            <a:lvl1pPr algn="l">
+              <a:defRPr sz="3000" b="1" cap="none" baseline="0"/>
+            </a:lvl1pPr>
+          </a:lstStyle>
+          <a:p>
+            <a:r>
+              <a:rPr lang="en-US" dirty="0"/>
               <a:t>Click to edit Master title style</a:t>
             </a:r>
           </a:p>
@@ -1028,26 +1000,26 @@
       </p:sp>
       <p:sp>
         <p:nvSpPr>
-          <p:cNvPr id="3" name="Subtitle 2"/>
-          <p:cNvSpPr>
-            <a:spLocks noGrp="1"/>
-          </p:cNvSpPr>
-          <p:nvPr>
-            <p:ph type="subTitle" idx="1"/>
+          <p:cNvPr id="3" name="Text Placeholder 2"/>
+          <p:cNvSpPr>
+            <a:spLocks noGrp="1"/>
+          </p:cNvSpPr>
+          <p:nvPr>
+            <p:ph type="body" idx="1"/>
           </p:nvPr>
         </p:nvSpPr>
         <p:spPr>
           <a:xfrm>
-            <a:off x="1371600" y="2914650"/>
-            <a:ext cx="6400800" cy="1314450"/>
+            <a:off x="722313" y="2180035"/>
+            <a:ext cx="7772400" cy="1125140"/>
           </a:xfrm>
         </p:spPr>
         <p:txBody>
-          <a:bodyPr/>
+          <a:bodyPr anchor="b"/>
           <a:lstStyle>
-            <a:lvl1pPr marL="0" indent="0" algn="ctr">
-              <a:buNone/>
-              <a:defRPr>
+            <a:lvl1pPr marL="0" indent="0">
+              <a:buNone/>
+              <a:defRPr sz="1500">
                 <a:solidFill>
                   <a:schemeClr val="tx1">
                     <a:tint val="75000"/>
@@ -1055,9 +1027,9 @@
                 </a:solidFill>
               </a:defRPr>
             </a:lvl1pPr>
-            <a:lvl2pPr marL="342900" indent="0" algn="ctr">
-              <a:buNone/>
-              <a:defRPr>
+            <a:lvl2pPr marL="342900" indent="0">
+              <a:buNone/>
+              <a:defRPr sz="1350">
                 <a:solidFill>
                   <a:schemeClr val="tx1">
                     <a:tint val="75000"/>
@@ -1065,9 +1037,9 @@
                 </a:solidFill>
               </a:defRPr>
             </a:lvl2pPr>
-            <a:lvl3pPr marL="685800" indent="0" algn="ctr">
-              <a:buNone/>
-              <a:defRPr>
+            <a:lvl3pPr marL="685800" indent="0">
+              <a:buNone/>
+              <a:defRPr sz="1200">
                 <a:solidFill>
                   <a:schemeClr val="tx1">
                     <a:tint val="75000"/>
@@ -1075,9 +1047,9 @@
                 </a:solidFill>
               </a:defRPr>
             </a:lvl3pPr>
-            <a:lvl4pPr marL="1028700" indent="0" algn="ctr">
-              <a:buNone/>
-              <a:defRPr>
+            <a:lvl4pPr marL="1028700" indent="0">
+              <a:buNone/>
+              <a:defRPr sz="1050">
                 <a:solidFill>
                   <a:schemeClr val="tx1">
                     <a:tint val="75000"/>
@@ -1085,9 +1057,9 @@
                 </a:solidFill>
               </a:defRPr>
             </a:lvl4pPr>
-            <a:lvl5pPr marL="1371600" indent="0" algn="ctr">
-              <a:buNone/>
-              <a:defRPr>
+            <a:lvl5pPr marL="1371600" indent="0">
+              <a:buNone/>
+              <a:defRPr sz="1050">
                 <a:solidFill>
                   <a:schemeClr val="tx1">
                     <a:tint val="75000"/>
@@ -1095,9 +1067,9 @@
                 </a:solidFill>
               </a:defRPr>
             </a:lvl5pPr>
-            <a:lvl6pPr marL="1714500" indent="0" algn="ctr">
-              <a:buNone/>
-              <a:defRPr>
+            <a:lvl6pPr marL="1714500" indent="0">
+              <a:buNone/>
+              <a:defRPr sz="1050">
                 <a:solidFill>
                   <a:schemeClr val="tx1">
                     <a:tint val="75000"/>
@@ -1105,9 +1077,9 @@
                 </a:solidFill>
               </a:defRPr>
             </a:lvl6pPr>
-            <a:lvl7pPr marL="2057400" indent="0" algn="ctr">
-              <a:buNone/>
-              <a:defRPr>
+            <a:lvl7pPr marL="2057400" indent="0">
+              <a:buNone/>
+              <a:defRPr sz="1050">
                 <a:solidFill>
                   <a:schemeClr val="tx1">
                     <a:tint val="75000"/>
@@ -1115,9 +1087,9 @@
                 </a:solidFill>
               </a:defRPr>
             </a:lvl7pPr>
-            <a:lvl8pPr marL="2400300" indent="0" algn="ctr">
-              <a:buNone/>
-              <a:defRPr>
+            <a:lvl8pPr marL="2400300" indent="0">
+              <a:buNone/>
+              <a:defRPr sz="1050">
                 <a:solidFill>
                   <a:schemeClr val="tx1">
                     <a:tint val="75000"/>
@@ -1125,9 +1097,9 @@
                 </a:solidFill>
               </a:defRPr>
             </a:lvl8pPr>
-            <a:lvl9pPr marL="2743200" indent="0" algn="ctr">
-              <a:buNone/>
-              <a:defRPr>
+            <a:lvl9pPr marL="2743200" indent="0">
+              <a:buNone/>
+              <a:defRPr sz="1050">
                 <a:solidFill>
                   <a:schemeClr val="tx1">
                     <a:tint val="75000"/>
@@ -1137,9 +1109,10 @@
             </a:lvl9pPr>
           </a:lstStyle>
           <a:p>
-            <a:r>
-              <a:rPr lang="en-US"/>
-              <a:t>Click to edit Master subtitle style</a:t>
+            <a:pPr lvl="0"/>
+            <a:r>
+              <a:rPr lang="en-US"/>
+              <a:t>Click to edit Master text styles</a:t>
             </a:r>
           </a:p>
         </p:txBody>
@@ -1154,30 +1127,16 @@
             <p:ph type="dt" sz="half" idx="10"/>
           </p:nvPr>
         </p:nvSpPr>
-        <p:spPr>
-          <a:xfrm>
-            <a:off x="133109" y="79515"/>
-            <a:ext cx="2133600" cy="273844"/>
-          </a:xfrm>
-        </p:spPr>
-        <p:txBody>
-          <a:bodyPr/>
-          <a:lstStyle>
-            <a:lvl1pPr>
-              <a:defRPr b="1">
-                <a:solidFill>
-                  <a:schemeClr val="tx1"/>
-                </a:solidFill>
-              </a:defRPr>
-            </a:lvl1pPr>
-          </a:lstStyle>
-          <a:p>
-            <a:fld id="{CDBC5A6A-A72D-6447-BE14-64EDA02DB0A6}" type="datetime1">
-              <a:rPr lang="de-CH" smtClean="0"/>
-              <a:pPr/>
-              <a:t>21.04.21</a:t>
+        <p:spPr/>
+        <p:txBody>
+          <a:bodyPr/>
+          <a:lstStyle/>
+          <a:p>
+            <a:fld id="{241EB5C9-1307-BA42-ABA2-0BC069CD8E7F}" type="datetimeFigureOut">
+              <a:rPr lang="en-US" smtClean="0"/>
+              <a:t>4/23/21</a:t>
             </a:fld>
-            <a:endParaRPr lang="en-US" dirty="0"/>
+            <a:endParaRPr lang="en-US"/>
           </a:p>
         </p:txBody>
       </p:sp>
@@ -1210,37 +1169,23 @@
             <p:ph type="sldNum" sz="quarter" idx="12"/>
           </p:nvPr>
         </p:nvSpPr>
-        <p:spPr>
-          <a:xfrm>
-            <a:off x="6867645" y="49524"/>
-            <a:ext cx="2133600" cy="273844"/>
-          </a:xfrm>
-        </p:spPr>
-        <p:txBody>
-          <a:bodyPr/>
-          <a:lstStyle>
-            <a:lvl1pPr>
-              <a:defRPr b="1">
-                <a:solidFill>
-                  <a:schemeClr val="tx1"/>
-                </a:solidFill>
-              </a:defRPr>
-            </a:lvl1pPr>
-          </a:lstStyle>
-          <a:p>
-            <a:fld id="{40F827CB-05CC-1F42-9FE6-72493269F883}" type="slidenum">
+        <p:spPr/>
+        <p:txBody>
+          <a:bodyPr/>
+          <a:lstStyle/>
+          <a:p>
+            <a:fld id="{C5EF2332-01BF-834F-8236-50238282D533}" type="slidenum">
               <a:rPr lang="en-US" smtClean="0"/>
-              <a:pPr/>
               <a:t>‹#›</a:t>
             </a:fld>
-            <a:endParaRPr lang="en-US" dirty="0"/>
+            <a:endParaRPr lang="en-US"/>
           </a:p>
         </p:txBody>
       </p:sp>
     </p:spTree>
     <p:extLst>
       <p:ext uri="{BB962C8B-B14F-4D97-AF65-F5344CB8AC3E}">
-        <p14:creationId xmlns:p14="http://schemas.microsoft.com/office/powerpoint/2010/main" val="1444357513"/>
+        <p14:creationId xmlns:p14="http://schemas.microsoft.com/office/powerpoint/2010/main" val="1073069076"/>
       </p:ext>
     </p:extLst>
   </p:cSld>
@@ -1472,9 +1417,9 @@
           <a:bodyPr/>
           <a:lstStyle/>
           <a:p>
-            <a:fld id="{74FCCE46-DD0F-B84C-900D-1DDC3B11A3C0}" type="datetime1">
-              <a:rPr lang="de-CH" smtClean="0"/>
-              <a:t>21.04.21</a:t>
+            <a:fld id="{241EB5C9-1307-BA42-ABA2-0BC069CD8E7F}" type="datetimeFigureOut">
+              <a:rPr lang="en-US" smtClean="0"/>
+              <a:t>4/23/21</a:t>
             </a:fld>
             <a:endParaRPr lang="en-US"/>
           </a:p>
@@ -1891,9 +1836,9 @@
           <a:bodyPr/>
           <a:lstStyle/>
           <a:p>
-            <a:fld id="{40972A8D-287C-834C-8D3E-DBE356442E27}" type="datetime1">
-              <a:rPr lang="de-CH" smtClean="0"/>
-              <a:t>21.04.21</a:t>
+            <a:fld id="{241EB5C9-1307-BA42-ABA2-0BC069CD8E7F}" type="datetimeFigureOut">
+              <a:rPr lang="en-US" smtClean="0"/>
+              <a:t>4/23/21</a:t>
             </a:fld>
             <a:endParaRPr lang="en-US"/>
           </a:p>
@@ -2008,9 +1953,9 @@
           <a:bodyPr/>
           <a:lstStyle/>
           <a:p>
-            <a:fld id="{4B497F74-1AB4-0F42-97F1-5FC4A2180FD9}" type="datetime1">
-              <a:rPr lang="de-CH" smtClean="0"/>
-              <a:t>21.04.21</a:t>
+            <a:fld id="{241EB5C9-1307-BA42-ABA2-0BC069CD8E7F}" type="datetimeFigureOut">
+              <a:rPr lang="en-US" smtClean="0"/>
+              <a:t>4/23/21</a:t>
             </a:fld>
             <a:endParaRPr lang="en-US"/>
           </a:p>
@@ -2103,9 +2048,9 @@
           <a:bodyPr/>
           <a:lstStyle/>
           <a:p>
-            <a:fld id="{940A61FA-0275-A847-9833-902ABE251E20}" type="datetime1">
-              <a:rPr lang="de-CH" smtClean="0"/>
-              <a:t>21.04.21</a:t>
+            <a:fld id="{241EB5C9-1307-BA42-ABA2-0BC069CD8E7F}" type="datetimeFigureOut">
+              <a:rPr lang="en-US" smtClean="0"/>
+              <a:t>4/23/21</a:t>
             </a:fld>
             <a:endParaRPr lang="en-US"/>
           </a:p>
@@ -2378,9 +2323,9 @@
           <a:bodyPr/>
           <a:lstStyle/>
           <a:p>
-            <a:fld id="{6F2E3E97-608A-0342-AEC6-FCED48971362}" type="datetime1">
-              <a:rPr lang="de-CH" smtClean="0"/>
-              <a:t>21.04.21</a:t>
+            <a:fld id="{241EB5C9-1307-BA42-ABA2-0BC069CD8E7F}" type="datetimeFigureOut">
+              <a:rPr lang="en-US" smtClean="0"/>
+              <a:t>4/23/21</a:t>
             </a:fld>
             <a:endParaRPr lang="en-US"/>
           </a:p>
@@ -2630,9 +2575,9 @@
           <a:bodyPr/>
           <a:lstStyle/>
           <a:p>
-            <a:fld id="{B44C92B5-49C5-0848-B8A7-DC05B7061CF4}" type="datetime1">
-              <a:rPr lang="de-CH" smtClean="0"/>
-              <a:t>21.04.21</a:t>
+            <a:fld id="{241EB5C9-1307-BA42-ABA2-0BC069CD8E7F}" type="datetimeFigureOut">
+              <a:rPr lang="en-US" smtClean="0"/>
+              <a:t>4/23/21</a:t>
             </a:fld>
             <a:endParaRPr lang="en-US"/>
           </a:p>
@@ -2820,7 +2765,7 @@
         </p:nvSpPr>
         <p:spPr>
           <a:xfrm>
-            <a:off x="457200" y="4756072"/>
+            <a:off x="457200" y="4767263"/>
             <a:ext cx="2133600" cy="273844"/>
           </a:xfrm>
           <a:prstGeom prst="rect">
@@ -2841,9 +2786,9 @@
             </a:lvl1pPr>
           </a:lstStyle>
           <a:p>
-            <a:fld id="{1A32F869-B25E-E949-86C6-F2FF68A541E9}" type="datetime1">
-              <a:rPr lang="de-CH" smtClean="0"/>
-              <a:t>21.04.21</a:t>
+            <a:fld id="{241EB5C9-1307-BA42-ABA2-0BC069CD8E7F}" type="datetimeFigureOut">
+              <a:rPr lang="en-US" smtClean="0"/>
+              <a:t>4/23/21</a:t>
             </a:fld>
             <a:endParaRPr lang="en-US"/>
           </a:p>
@@ -2861,7 +2806,7 @@
         </p:nvSpPr>
         <p:spPr>
           <a:xfrm>
-            <a:off x="3124200" y="4756072"/>
+            <a:off x="3124200" y="4767263"/>
             <a:ext cx="2895600" cy="273844"/>
           </a:xfrm>
           <a:prstGeom prst="rect">
@@ -2898,7 +2843,7 @@
         </p:nvSpPr>
         <p:spPr>
           <a:xfrm>
-            <a:off x="6553200" y="4756072"/>
+            <a:off x="6553200" y="4767263"/>
             <a:ext cx="2133600" cy="273844"/>
           </a:xfrm>
           <a:prstGeom prst="rect">
@@ -2932,7 +2877,7 @@
           <p:cNvPr id="7" name="Google Shape;14;p1">
             <a:extLst>
               <a:ext uri="{FF2B5EF4-FFF2-40B4-BE49-F238E27FC236}">
-                <a16:creationId xmlns:a16="http://schemas.microsoft.com/office/drawing/2014/main" id="{DC4A3B21-F2C5-9A46-96BF-5D84BB597444}"/>
+                <a16:creationId xmlns:a16="http://schemas.microsoft.com/office/drawing/2014/main" id="{33925F48-CC2D-9A41-B458-F523A9EC3EFA}"/>
               </a:ext>
             </a:extLst>
           </p:cNvPr>
@@ -2986,7 +2931,7 @@
           <p:cNvPr id="8" name="Google Shape;15;p1">
             <a:extLst>
               <a:ext uri="{FF2B5EF4-FFF2-40B4-BE49-F238E27FC236}">
-                <a16:creationId xmlns:a16="http://schemas.microsoft.com/office/drawing/2014/main" id="{BA97363A-3EE5-4B4D-BAB7-1CC4604DD5B9}"/>
+                <a16:creationId xmlns:a16="http://schemas.microsoft.com/office/drawing/2014/main" id="{10AE0908-FBE0-8A4D-B55B-D963F14FEBE3}"/>
               </a:ext>
             </a:extLst>
           </p:cNvPr>
@@ -3019,7 +2964,7 @@
           <p:cNvPr id="9" name="Google Shape;16;p1">
             <a:extLst>
               <a:ext uri="{FF2B5EF4-FFF2-40B4-BE49-F238E27FC236}">
-                <a16:creationId xmlns:a16="http://schemas.microsoft.com/office/drawing/2014/main" id="{61157DB4-BA48-BE45-8C9D-C5F2022D5527}"/>
+                <a16:creationId xmlns:a16="http://schemas.microsoft.com/office/drawing/2014/main" id="{E4C9A1FE-8A12-9B45-9E66-51B15C1C6C37}"/>
               </a:ext>
             </a:extLst>
           </p:cNvPr>
@@ -3077,7 +3022,7 @@
           <p:cNvPr id="10" name="Google Shape;17;p1">
             <a:extLst>
               <a:ext uri="{FF2B5EF4-FFF2-40B4-BE49-F238E27FC236}">
-                <a16:creationId xmlns:a16="http://schemas.microsoft.com/office/drawing/2014/main" id="{CF25A1F4-B2F6-6149-AEF1-5EF356656151}"/>
+                <a16:creationId xmlns:a16="http://schemas.microsoft.com/office/drawing/2014/main" id="{39915D6B-433A-DB46-945B-AD6DD15C22F0}"/>
               </a:ext>
             </a:extLst>
           </p:cNvPr>
@@ -3139,9 +3084,9 @@
   </p:cSld>
   <p:clrMap bg1="lt1" tx1="dk1" bg2="lt2" tx2="dk2" accent1="accent1" accent2="accent2" accent3="accent3" accent4="accent4" accent5="accent5" accent6="accent6" hlink="hlink" folHlink="folHlink"/>
   <p:sldLayoutIdLst>
-    <p:sldLayoutId id="2147483651" r:id="rId1"/>
+    <p:sldLayoutId id="2147483649" r:id="rId1"/>
     <p:sldLayoutId id="2147483650" r:id="rId2"/>
-    <p:sldLayoutId id="2147483649" r:id="rId3"/>
+    <p:sldLayoutId id="2147483651" r:id="rId3"/>
     <p:sldLayoutId id="2147483652" r:id="rId4"/>
     <p:sldLayoutId id="2147483653" r:id="rId5"/>
     <p:sldLayoutId id="2147483654" r:id="rId6"/>
@@ -3151,7 +3096,6 @@
     <p:sldLayoutId id="2147483658" r:id="rId10"/>
     <p:sldLayoutId id="2147483659" r:id="rId11"/>
   </p:sldLayoutIdLst>
-  <p:hf sldNum="0" hdr="0" ftr="0"/>
   <p:txStyles>
     <p:titleStyle>
       <a:lvl1pPr algn="ctr" defTabSz="342900" rtl="0" eaLnBrk="1" latinLnBrk="0" hangingPunct="1">
@@ -3446,7 +3390,7 @@
               <a:buNone/>
             </a:pPr>
             <a:r>
-              <a:t>Summary Report COVID Contact Tracing Côte d’Ivoire</a:t>
+              <a:t>COVID Contact Tracing Report: Côte d’Ivoire</a:t>
             </a:r>
           </a:p>
         </p:txBody>
@@ -3480,6 +3424,420 @@
           </a:p>
         </p:txBody>
       </p:sp>
+    </p:spTree>
+  </p:cSld>
+  <p:clrMapOvr>
+    <a:masterClrMapping/>
+  </p:clrMapOvr>
+</p:sld>
+</file>
+
+<file path=ppt/slides/slide10.xml><?xml version="1.0" encoding="utf-8"?>
+<p:sld xmlns:a="http://schemas.openxmlformats.org/drawingml/2006/main" xmlns:r="http://schemas.openxmlformats.org/officeDocument/2006/relationships" xmlns:p="http://schemas.openxmlformats.org/presentationml/2006/main">
+  <p:cSld>
+    <p:spTree>
+      <p:nvGrpSpPr>
+        <p:cNvPr id="1" name=""/>
+        <p:cNvGrpSpPr/>
+        <p:nvPr/>
+      </p:nvGrpSpPr>
+      <p:grpSpPr>
+        <a:xfrm>
+          <a:off x="0" y="0"/>
+          <a:ext cx="0" cy="0"/>
+          <a:chOff x="0" y="0"/>
+          <a:chExt cx="0" cy="0"/>
+        </a:xfrm>
+      </p:grpSpPr>
+      <p:sp>
+        <p:nvSpPr>
+          <p:cNvPr id="2" name="Title 1"/>
+          <p:cNvSpPr>
+            <a:spLocks noGrp="1"/>
+          </p:cNvSpPr>
+          <p:nvPr>
+            <p:ph type="title"/>
+          </p:nvPr>
+        </p:nvSpPr>
+        <p:spPr/>
+        <p:txBody>
+          <a:bodyPr/>
+          <a:lstStyle/>
+          <a:p>
+            <a:pPr marL="0" lvl="0" indent="0">
+              <a:buNone/>
+            </a:pPr>
+            <a:r>
+              <a:t>Level 2</a:t>
+            </a:r>
+          </a:p>
+        </p:txBody>
+      </p:sp>
+      <p:sp>
+        <p:nvSpPr>
+          <p:cNvPr id="3" name="Content Placeholder 2"/>
+          <p:cNvSpPr>
+            <a:spLocks noGrp="1"/>
+          </p:cNvSpPr>
+          <p:nvPr>
+            <p:ph idx="1"/>
+          </p:nvPr>
+        </p:nvSpPr>
+        <p:spPr/>
+        <p:txBody>
+          <a:bodyPr/>
+          <a:lstStyle/>
+          <a:p>
+            <a:pPr marL="0" lvl="0" indent="0">
+              <a:buNone/>
+            </a:pPr>
+            <a:r>
+              <a:t>Hello I sell cars</a:t>
+            </a:r>
+          </a:p>
+        </p:txBody>
+      </p:sp>
+    </p:spTree>
+  </p:cSld>
+  <p:clrMapOvr>
+    <a:masterClrMapping/>
+  </p:clrMapOvr>
+</p:sld>
+</file>
+
+<file path=ppt/slides/slide11.xml><?xml version="1.0" encoding="utf-8"?>
+<p:sld xmlns:a="http://schemas.openxmlformats.org/drawingml/2006/main" xmlns:r="http://schemas.openxmlformats.org/officeDocument/2006/relationships" xmlns:p="http://schemas.openxmlformats.org/presentationml/2006/main">
+  <p:cSld>
+    <p:spTree>
+      <p:nvGrpSpPr>
+        <p:cNvPr id="1" name=""/>
+        <p:cNvGrpSpPr/>
+        <p:nvPr/>
+      </p:nvGrpSpPr>
+      <p:grpSpPr>
+        <a:xfrm>
+          <a:off x="0" y="0"/>
+          <a:ext cx="0" cy="0"/>
+          <a:chOff x="0" y="0"/>
+          <a:chExt cx="0" cy="0"/>
+        </a:xfrm>
+      </p:grpSpPr>
+      <p:pic>
+        <p:nvPicPr>
+          <p:cNvPr id="2" name="Picture 1" descr="zz_temp_files/figure-pptx/unnamed-chunk-4-1.png"/>
+          <p:cNvPicPr>
+            <a:picLocks noGrp="1" noChangeAspect="1"/>
+          </p:cNvPicPr>
+          <p:nvPr/>
+        </p:nvPicPr>
+        <p:blipFill>
+          <a:blip r:embed="rId2"/>
+          <a:stretch>
+            <a:fillRect/>
+          </a:stretch>
+        </p:blipFill>
+        <p:spPr bwMode="auto">
+          <a:xfrm>
+            <a:off x="2451100" y="1193800"/>
+            <a:ext cx="4241800" cy="3390900"/>
+          </a:xfrm>
+          <a:prstGeom prst="rect">
+            <a:avLst/>
+          </a:prstGeom>
+          <a:noFill/>
+          <a:ln w="9525">
+            <a:noFill/>
+            <a:headEnd/>
+            <a:tailEnd/>
+          </a:ln>
+        </p:spPr>
+      </p:pic>
+    </p:spTree>
+  </p:cSld>
+  <p:clrMapOvr>
+    <a:masterClrMapping/>
+  </p:clrMapOvr>
+</p:sld>
+</file>
+
+<file path=ppt/slides/slide12.xml><?xml version="1.0" encoding="utf-8"?>
+<p:sld xmlns:a="http://schemas.openxmlformats.org/drawingml/2006/main" xmlns:r="http://schemas.openxmlformats.org/officeDocument/2006/relationships" xmlns:p="http://schemas.openxmlformats.org/presentationml/2006/main">
+  <p:cSld>
+    <p:spTree>
+      <p:nvGrpSpPr>
+        <p:cNvPr id="1" name=""/>
+        <p:cNvGrpSpPr/>
+        <p:nvPr/>
+      </p:nvGrpSpPr>
+      <p:grpSpPr>
+        <a:xfrm>
+          <a:off x="0" y="0"/>
+          <a:ext cx="0" cy="0"/>
+          <a:chOff x="0" y="0"/>
+          <a:chExt cx="0" cy="0"/>
+        </a:xfrm>
+      </p:grpSpPr>
+      <p:sp>
+        <p:nvSpPr>
+          <p:cNvPr id="2" name="Title 1"/>
+          <p:cNvSpPr>
+            <a:spLocks noGrp="1"/>
+          </p:cNvSpPr>
+          <p:nvPr>
+            <p:ph type="title"/>
+          </p:nvPr>
+        </p:nvSpPr>
+        <p:spPr>
+          <a:xfrm>
+            <a:off x="722313" y="3305176"/>
+            <a:ext cx="7772400" cy="1021556"/>
+          </a:xfrm>
+        </p:spPr>
+        <p:txBody>
+          <a:bodyPr/>
+          <a:lstStyle/>
+          <a:p>
+            <a:pPr marL="0" lvl="0" indent="0">
+              <a:buNone/>
+            </a:pPr>
+            <a:r>
+              <a:t>Level 1</a:t>
+            </a:r>
+          </a:p>
+        </p:txBody>
+      </p:sp>
+    </p:spTree>
+  </p:cSld>
+  <p:clrMapOvr>
+    <a:masterClrMapping/>
+  </p:clrMapOvr>
+</p:sld>
+</file>
+
+<file path=ppt/slides/slide13.xml><?xml version="1.0" encoding="utf-8"?>
+<p:sld xmlns:a="http://schemas.openxmlformats.org/drawingml/2006/main" xmlns:r="http://schemas.openxmlformats.org/officeDocument/2006/relationships" xmlns:p="http://schemas.openxmlformats.org/presentationml/2006/main">
+  <p:cSld>
+    <p:spTree>
+      <p:nvGrpSpPr>
+        <p:cNvPr id="1" name=""/>
+        <p:cNvGrpSpPr/>
+        <p:nvPr/>
+      </p:nvGrpSpPr>
+      <p:grpSpPr>
+        <a:xfrm>
+          <a:off x="0" y="0"/>
+          <a:ext cx="0" cy="0"/>
+          <a:chOff x="0" y="0"/>
+          <a:chExt cx="0" cy="0"/>
+        </a:xfrm>
+      </p:grpSpPr>
+      <p:sp>
+        <p:nvSpPr>
+          <p:cNvPr id="3" name="Content Placeholder 2"/>
+          <p:cNvSpPr>
+            <a:spLocks noGrp="1"/>
+          </p:cNvSpPr>
+          <p:nvPr>
+            <p:ph idx="1"/>
+          </p:nvPr>
+        </p:nvSpPr>
+        <p:spPr/>
+        <p:txBody>
+          <a:bodyPr/>
+          <a:lstStyle/>
+          <a:p>
+            <a:pPr marL="0" lvl="0" indent="0">
+              <a:buNone/>
+            </a:pPr>
+            <a:r>
+              <a:t>Hello I sell cars</a:t>
+            </a:r>
+          </a:p>
+        </p:txBody>
+      </p:sp>
+    </p:spTree>
+  </p:cSld>
+  <p:clrMapOvr>
+    <a:masterClrMapping/>
+  </p:clrMapOvr>
+</p:sld>
+</file>
+
+<file path=ppt/slides/slide14.xml><?xml version="1.0" encoding="utf-8"?>
+<p:sld xmlns:a="http://schemas.openxmlformats.org/drawingml/2006/main" xmlns:r="http://schemas.openxmlformats.org/officeDocument/2006/relationships" xmlns:p="http://schemas.openxmlformats.org/presentationml/2006/main">
+  <p:cSld>
+    <p:spTree>
+      <p:nvGrpSpPr>
+        <p:cNvPr id="1" name=""/>
+        <p:cNvGrpSpPr/>
+        <p:nvPr/>
+      </p:nvGrpSpPr>
+      <p:grpSpPr>
+        <a:xfrm>
+          <a:off x="0" y="0"/>
+          <a:ext cx="0" cy="0"/>
+          <a:chOff x="0" y="0"/>
+          <a:chExt cx="0" cy="0"/>
+        </a:xfrm>
+      </p:grpSpPr>
+      <p:pic>
+        <p:nvPicPr>
+          <p:cNvPr id="2" name="Picture 1" descr="zz_temp_files/figure-pptx/unnamed-chunk-5-1.png"/>
+          <p:cNvPicPr>
+            <a:picLocks noGrp="1" noChangeAspect="1"/>
+          </p:cNvPicPr>
+          <p:nvPr/>
+        </p:nvPicPr>
+        <p:blipFill>
+          <a:blip r:embed="rId2"/>
+          <a:stretch>
+            <a:fillRect/>
+          </a:stretch>
+        </p:blipFill>
+        <p:spPr bwMode="auto">
+          <a:xfrm>
+            <a:off x="2451100" y="1193800"/>
+            <a:ext cx="4241800" cy="3390900"/>
+          </a:xfrm>
+          <a:prstGeom prst="rect">
+            <a:avLst/>
+          </a:prstGeom>
+          <a:noFill/>
+          <a:ln w="9525">
+            <a:noFill/>
+            <a:headEnd/>
+            <a:tailEnd/>
+          </a:ln>
+        </p:spPr>
+      </p:pic>
+    </p:spTree>
+  </p:cSld>
+  <p:clrMapOvr>
+    <a:masterClrMapping/>
+  </p:clrMapOvr>
+</p:sld>
+</file>
+
+<file path=ppt/slides/slide15.xml><?xml version="1.0" encoding="utf-8"?>
+<p:sld xmlns:a="http://schemas.openxmlformats.org/drawingml/2006/main" xmlns:r="http://schemas.openxmlformats.org/officeDocument/2006/relationships" xmlns:p="http://schemas.openxmlformats.org/presentationml/2006/main">
+  <p:cSld>
+    <p:spTree>
+      <p:nvGrpSpPr>
+        <p:cNvPr id="1" name=""/>
+        <p:cNvGrpSpPr/>
+        <p:nvPr/>
+      </p:nvGrpSpPr>
+      <p:grpSpPr>
+        <a:xfrm>
+          <a:off x="0" y="0"/>
+          <a:ext cx="0" cy="0"/>
+          <a:chOff x="0" y="0"/>
+          <a:chExt cx="0" cy="0"/>
+        </a:xfrm>
+      </p:grpSpPr>
+      <p:sp>
+        <p:nvSpPr>
+          <p:cNvPr id="2" name="Title 1"/>
+          <p:cNvSpPr>
+            <a:spLocks noGrp="1"/>
+          </p:cNvSpPr>
+          <p:nvPr>
+            <p:ph type="title"/>
+          </p:nvPr>
+        </p:nvSpPr>
+        <p:spPr/>
+        <p:txBody>
+          <a:bodyPr/>
+          <a:lstStyle/>
+          <a:p>
+            <a:pPr marL="0" lvl="0" indent="0">
+              <a:buNone/>
+            </a:pPr>
+            <a:r>
+              <a:t>Level 2</a:t>
+            </a:r>
+          </a:p>
+        </p:txBody>
+      </p:sp>
+      <p:sp>
+        <p:nvSpPr>
+          <p:cNvPr id="3" name="Content Placeholder 2"/>
+          <p:cNvSpPr>
+            <a:spLocks noGrp="1"/>
+          </p:cNvSpPr>
+          <p:nvPr>
+            <p:ph idx="1"/>
+          </p:nvPr>
+        </p:nvSpPr>
+        <p:spPr/>
+        <p:txBody>
+          <a:bodyPr/>
+          <a:lstStyle/>
+          <a:p>
+            <a:pPr marL="0" lvl="0" indent="0">
+              <a:buNone/>
+            </a:pPr>
+            <a:r>
+              <a:t>Hello I sell cars</a:t>
+            </a:r>
+          </a:p>
+        </p:txBody>
+      </p:sp>
+    </p:spTree>
+  </p:cSld>
+  <p:clrMapOvr>
+    <a:masterClrMapping/>
+  </p:clrMapOvr>
+</p:sld>
+</file>
+
+<file path=ppt/slides/slide16.xml><?xml version="1.0" encoding="utf-8"?>
+<p:sld xmlns:a="http://schemas.openxmlformats.org/drawingml/2006/main" xmlns:r="http://schemas.openxmlformats.org/officeDocument/2006/relationships" xmlns:p="http://schemas.openxmlformats.org/presentationml/2006/main">
+  <p:cSld>
+    <p:spTree>
+      <p:nvGrpSpPr>
+        <p:cNvPr id="1" name=""/>
+        <p:cNvGrpSpPr/>
+        <p:nvPr/>
+      </p:nvGrpSpPr>
+      <p:grpSpPr>
+        <a:xfrm>
+          <a:off x="0" y="0"/>
+          <a:ext cx="0" cy="0"/>
+          <a:chOff x="0" y="0"/>
+          <a:chExt cx="0" cy="0"/>
+        </a:xfrm>
+      </p:grpSpPr>
+      <p:pic>
+        <p:nvPicPr>
+          <p:cNvPr id="2" name="Picture 1" descr="zz_temp_files/figure-pptx/unnamed-chunk-6-1.png"/>
+          <p:cNvPicPr>
+            <a:picLocks noGrp="1" noChangeAspect="1"/>
+          </p:cNvPicPr>
+          <p:nvPr/>
+        </p:nvPicPr>
+        <p:blipFill>
+          <a:blip r:embed="rId2"/>
+          <a:stretch>
+            <a:fillRect/>
+          </a:stretch>
+        </p:blipFill>
+        <p:spPr bwMode="auto">
+          <a:xfrm>
+            <a:off x="2451100" y="1193800"/>
+            <a:ext cx="4241800" cy="3390900"/>
+          </a:xfrm>
+          <a:prstGeom prst="rect">
+            <a:avLst/>
+          </a:prstGeom>
+          <a:noFill/>
+          <a:ln w="9525">
+            <a:noFill/>
+            <a:headEnd/>
+            <a:tailEnd/>
+          </a:ln>
+        </p:spPr>
+      </p:pic>
     </p:spTree>
   </p:cSld>
   <p:clrMapOvr>
@@ -3529,7 +3887,7 @@
               <a:buNone/>
             </a:pPr>
             <a:r>
-              <a:t>All contacts</a:t>
+              <a:t>Level 1</a:t>
             </a:r>
           </a:p>
         </p:txBody>
@@ -3561,6 +3919,110 @@
       </p:grpSpPr>
       <p:sp>
         <p:nvSpPr>
+          <p:cNvPr id="3" name="Content Placeholder 2"/>
+          <p:cNvSpPr>
+            <a:spLocks noGrp="1"/>
+          </p:cNvSpPr>
+          <p:nvPr>
+            <p:ph idx="1"/>
+          </p:nvPr>
+        </p:nvSpPr>
+        <p:spPr/>
+        <p:txBody>
+          <a:bodyPr/>
+          <a:lstStyle/>
+          <a:p>
+            <a:pPr marL="0" lvl="0" indent="0">
+              <a:buNone/>
+            </a:pPr>
+            <a:r>
+              <a:t>Hello I sell cars</a:t>
+            </a:r>
+          </a:p>
+        </p:txBody>
+      </p:sp>
+    </p:spTree>
+  </p:cSld>
+  <p:clrMapOvr>
+    <a:masterClrMapping/>
+  </p:clrMapOvr>
+</p:sld>
+</file>
+
+<file path=ppt/slides/slide4.xml><?xml version="1.0" encoding="utf-8"?>
+<p:sld xmlns:a="http://schemas.openxmlformats.org/drawingml/2006/main" xmlns:r="http://schemas.openxmlformats.org/officeDocument/2006/relationships" xmlns:p="http://schemas.openxmlformats.org/presentationml/2006/main">
+  <p:cSld>
+    <p:spTree>
+      <p:nvGrpSpPr>
+        <p:cNvPr id="1" name=""/>
+        <p:cNvGrpSpPr/>
+        <p:nvPr/>
+      </p:nvGrpSpPr>
+      <p:grpSpPr>
+        <a:xfrm>
+          <a:off x="0" y="0"/>
+          <a:ext cx="0" cy="0"/>
+          <a:chOff x="0" y="0"/>
+          <a:chExt cx="0" cy="0"/>
+        </a:xfrm>
+      </p:grpSpPr>
+      <p:pic>
+        <p:nvPicPr>
+          <p:cNvPr id="2" name="Picture 1" descr="zz_temp_files/figure-pptx/unnamed-chunk-1-1.png"/>
+          <p:cNvPicPr>
+            <a:picLocks noGrp="1" noChangeAspect="1"/>
+          </p:cNvPicPr>
+          <p:nvPr/>
+        </p:nvPicPr>
+        <p:blipFill>
+          <a:blip r:embed="rId2"/>
+          <a:stretch>
+            <a:fillRect/>
+          </a:stretch>
+        </p:blipFill>
+        <p:spPr bwMode="auto">
+          <a:xfrm>
+            <a:off x="2451100" y="1193800"/>
+            <a:ext cx="4241800" cy="3390900"/>
+          </a:xfrm>
+          <a:prstGeom prst="rect">
+            <a:avLst/>
+          </a:prstGeom>
+          <a:noFill/>
+          <a:ln w="9525">
+            <a:noFill/>
+            <a:headEnd/>
+            <a:tailEnd/>
+          </a:ln>
+        </p:spPr>
+      </p:pic>
+    </p:spTree>
+  </p:cSld>
+  <p:clrMapOvr>
+    <a:masterClrMapping/>
+  </p:clrMapOvr>
+</p:sld>
+</file>
+
+<file path=ppt/slides/slide5.xml><?xml version="1.0" encoding="utf-8"?>
+<p:sld xmlns:a="http://schemas.openxmlformats.org/drawingml/2006/main" xmlns:r="http://schemas.openxmlformats.org/officeDocument/2006/relationships" xmlns:p="http://schemas.openxmlformats.org/presentationml/2006/main">
+  <p:cSld>
+    <p:spTree>
+      <p:nvGrpSpPr>
+        <p:cNvPr id="1" name=""/>
+        <p:cNvGrpSpPr/>
+        <p:nvPr/>
+      </p:nvGrpSpPr>
+      <p:grpSpPr>
+        <a:xfrm>
+          <a:off x="0" y="0"/>
+          <a:ext cx="0" cy="0"/>
+          <a:chOff x="0" y="0"/>
+          <a:chExt cx="0" cy="0"/>
+        </a:xfrm>
+      </p:grpSpPr>
+      <p:sp>
+        <p:nvSpPr>
           <p:cNvPr id="2" name="Title 1"/>
           <p:cNvSpPr>
             <a:spLocks noGrp="1"/>
@@ -3578,11 +4040,248 @@
               <a:buNone/>
             </a:pPr>
             <a:r>
-              <a:t>Table</a:t>
-            </a:r>
-          </a:p>
-        </p:txBody>
-      </p:sp>
+              <a:t>Level 2</a:t>
+            </a:r>
+          </a:p>
+        </p:txBody>
+      </p:sp>
+      <p:sp>
+        <p:nvSpPr>
+          <p:cNvPr id="3" name="Content Placeholder 2"/>
+          <p:cNvSpPr>
+            <a:spLocks noGrp="1"/>
+          </p:cNvSpPr>
+          <p:nvPr>
+            <p:ph idx="1"/>
+          </p:nvPr>
+        </p:nvSpPr>
+        <p:spPr/>
+        <p:txBody>
+          <a:bodyPr/>
+          <a:lstStyle/>
+          <a:p>
+            <a:pPr marL="0" lvl="0" indent="0">
+              <a:buNone/>
+            </a:pPr>
+            <a:r>
+              <a:t>Hello I sell cars</a:t>
+            </a:r>
+          </a:p>
+        </p:txBody>
+      </p:sp>
+    </p:spTree>
+  </p:cSld>
+  <p:clrMapOvr>
+    <a:masterClrMapping/>
+  </p:clrMapOvr>
+</p:sld>
+</file>
+
+<file path=ppt/slides/slide6.xml><?xml version="1.0" encoding="utf-8"?>
+<p:sld xmlns:a="http://schemas.openxmlformats.org/drawingml/2006/main" xmlns:r="http://schemas.openxmlformats.org/officeDocument/2006/relationships" xmlns:p="http://schemas.openxmlformats.org/presentationml/2006/main">
+  <p:cSld>
+    <p:spTree>
+      <p:nvGrpSpPr>
+        <p:cNvPr id="1" name=""/>
+        <p:cNvGrpSpPr/>
+        <p:nvPr/>
+      </p:nvGrpSpPr>
+      <p:grpSpPr>
+        <a:xfrm>
+          <a:off x="0" y="0"/>
+          <a:ext cx="0" cy="0"/>
+          <a:chOff x="0" y="0"/>
+          <a:chExt cx="0" cy="0"/>
+        </a:xfrm>
+      </p:grpSpPr>
+      <p:pic>
+        <p:nvPicPr>
+          <p:cNvPr id="2" name="Picture 1" descr="zz_temp_files/figure-pptx/unnamed-chunk-2-1.png"/>
+          <p:cNvPicPr>
+            <a:picLocks noGrp="1" noChangeAspect="1"/>
+          </p:cNvPicPr>
+          <p:nvPr/>
+        </p:nvPicPr>
+        <p:blipFill>
+          <a:blip r:embed="rId2"/>
+          <a:stretch>
+            <a:fillRect/>
+          </a:stretch>
+        </p:blipFill>
+        <p:spPr bwMode="auto">
+          <a:xfrm>
+            <a:off x="2451100" y="1193800"/>
+            <a:ext cx="4241800" cy="3390900"/>
+          </a:xfrm>
+          <a:prstGeom prst="rect">
+            <a:avLst/>
+          </a:prstGeom>
+          <a:noFill/>
+          <a:ln w="9525">
+            <a:noFill/>
+            <a:headEnd/>
+            <a:tailEnd/>
+          </a:ln>
+        </p:spPr>
+      </p:pic>
+    </p:spTree>
+  </p:cSld>
+  <p:clrMapOvr>
+    <a:masterClrMapping/>
+  </p:clrMapOvr>
+</p:sld>
+</file>
+
+<file path=ppt/slides/slide7.xml><?xml version="1.0" encoding="utf-8"?>
+<p:sld xmlns:a="http://schemas.openxmlformats.org/drawingml/2006/main" xmlns:r="http://schemas.openxmlformats.org/officeDocument/2006/relationships" xmlns:p="http://schemas.openxmlformats.org/presentationml/2006/main">
+  <p:cSld>
+    <p:spTree>
+      <p:nvGrpSpPr>
+        <p:cNvPr id="1" name=""/>
+        <p:cNvGrpSpPr/>
+        <p:nvPr/>
+      </p:nvGrpSpPr>
+      <p:grpSpPr>
+        <a:xfrm>
+          <a:off x="0" y="0"/>
+          <a:ext cx="0" cy="0"/>
+          <a:chOff x="0" y="0"/>
+          <a:chExt cx="0" cy="0"/>
+        </a:xfrm>
+      </p:grpSpPr>
+      <p:sp>
+        <p:nvSpPr>
+          <p:cNvPr id="2" name="Title 1"/>
+          <p:cNvSpPr>
+            <a:spLocks noGrp="1"/>
+          </p:cNvSpPr>
+          <p:nvPr>
+            <p:ph type="title"/>
+          </p:nvPr>
+        </p:nvSpPr>
+        <p:spPr>
+          <a:xfrm>
+            <a:off x="722313" y="3305176"/>
+            <a:ext cx="7772400" cy="1021556"/>
+          </a:xfrm>
+        </p:spPr>
+        <p:txBody>
+          <a:bodyPr/>
+          <a:lstStyle/>
+          <a:p>
+            <a:pPr marL="0" lvl="0" indent="0">
+              <a:buNone/>
+            </a:pPr>
+            <a:r>
+              <a:t>Level 1</a:t>
+            </a:r>
+          </a:p>
+        </p:txBody>
+      </p:sp>
+    </p:spTree>
+  </p:cSld>
+  <p:clrMapOvr>
+    <a:masterClrMapping/>
+  </p:clrMapOvr>
+</p:sld>
+</file>
+
+<file path=ppt/slides/slide8.xml><?xml version="1.0" encoding="utf-8"?>
+<p:sld xmlns:a="http://schemas.openxmlformats.org/drawingml/2006/main" xmlns:r="http://schemas.openxmlformats.org/officeDocument/2006/relationships" xmlns:p="http://schemas.openxmlformats.org/presentationml/2006/main">
+  <p:cSld>
+    <p:spTree>
+      <p:nvGrpSpPr>
+        <p:cNvPr id="1" name=""/>
+        <p:cNvGrpSpPr/>
+        <p:nvPr/>
+      </p:nvGrpSpPr>
+      <p:grpSpPr>
+        <a:xfrm>
+          <a:off x="0" y="0"/>
+          <a:ext cx="0" cy="0"/>
+          <a:chOff x="0" y="0"/>
+          <a:chExt cx="0" cy="0"/>
+        </a:xfrm>
+      </p:grpSpPr>
+      <p:sp>
+        <p:nvSpPr>
+          <p:cNvPr id="3" name="Content Placeholder 2"/>
+          <p:cNvSpPr>
+            <a:spLocks noGrp="1"/>
+          </p:cNvSpPr>
+          <p:nvPr>
+            <p:ph idx="1"/>
+          </p:nvPr>
+        </p:nvSpPr>
+        <p:spPr/>
+        <p:txBody>
+          <a:bodyPr/>
+          <a:lstStyle/>
+          <a:p>
+            <a:pPr marL="0" lvl="0" indent="0">
+              <a:buNone/>
+            </a:pPr>
+            <a:r>
+              <a:t>Hello I sell cars</a:t>
+            </a:r>
+          </a:p>
+        </p:txBody>
+      </p:sp>
+    </p:spTree>
+  </p:cSld>
+  <p:clrMapOvr>
+    <a:masterClrMapping/>
+  </p:clrMapOvr>
+</p:sld>
+</file>
+
+<file path=ppt/slides/slide9.xml><?xml version="1.0" encoding="utf-8"?>
+<p:sld xmlns:a="http://schemas.openxmlformats.org/drawingml/2006/main" xmlns:r="http://schemas.openxmlformats.org/officeDocument/2006/relationships" xmlns:p="http://schemas.openxmlformats.org/presentationml/2006/main">
+  <p:cSld>
+    <p:spTree>
+      <p:nvGrpSpPr>
+        <p:cNvPr id="1" name=""/>
+        <p:cNvGrpSpPr/>
+        <p:nvPr/>
+      </p:nvGrpSpPr>
+      <p:grpSpPr>
+        <a:xfrm>
+          <a:off x="0" y="0"/>
+          <a:ext cx="0" cy="0"/>
+          <a:chOff x="0" y="0"/>
+          <a:chExt cx="0" cy="0"/>
+        </a:xfrm>
+      </p:grpSpPr>
+      <p:pic>
+        <p:nvPicPr>
+          <p:cNvPr id="2" name="Picture 1" descr="zz_temp_files/figure-pptx/unnamed-chunk-3-1.png"/>
+          <p:cNvPicPr>
+            <a:picLocks noGrp="1" noChangeAspect="1"/>
+          </p:cNvPicPr>
+          <p:nvPr/>
+        </p:nvPicPr>
+        <p:blipFill>
+          <a:blip r:embed="rId2"/>
+          <a:stretch>
+            <a:fillRect/>
+          </a:stretch>
+        </p:blipFill>
+        <p:spPr bwMode="auto">
+          <a:xfrm>
+            <a:off x="2451100" y="1193800"/>
+            <a:ext cx="4241800" cy="3390900"/>
+          </a:xfrm>
+          <a:prstGeom prst="rect">
+            <a:avLst/>
+          </a:prstGeom>
+          <a:noFill/>
+          <a:ln w="9525">
+            <a:noFill/>
+            <a:headEnd/>
+            <a:tailEnd/>
+          </a:ln>
+        </p:spPr>
+      </p:pic>
     </p:spTree>
   </p:cSld>
   <p:clrMapOvr>
@@ -3594,7 +4293,7 @@
 <file path=ppt/theme/theme1.xml><?xml version="1.0" encoding="utf-8"?>
 <a:theme xmlns:a="http://schemas.openxmlformats.org/drawingml/2006/main" name="Office Theme">
   <a:themeElements>
-    <a:clrScheme name="Blue">
+    <a:clrScheme name="Office">
       <a:dk1>
         <a:sysClr val="windowText" lastClr="000000"/>
       </a:dk1>
@@ -3602,34 +4301,34 @@
         <a:sysClr val="window" lastClr="FFFFFF"/>
       </a:lt1>
       <a:dk2>
-        <a:srgbClr val="17406D"/>
+        <a:srgbClr val="1F497D"/>
       </a:dk2>
       <a:lt2>
-        <a:srgbClr val="DBEFF9"/>
+        <a:srgbClr val="EEECE1"/>
       </a:lt2>
       <a:accent1>
-        <a:srgbClr val="0F6FC6"/>
+        <a:srgbClr val="4F81BD"/>
       </a:accent1>
       <a:accent2>
-        <a:srgbClr val="009DD9"/>
+        <a:srgbClr val="C0504D"/>
       </a:accent2>
       <a:accent3>
-        <a:srgbClr val="0BD0D9"/>
+        <a:srgbClr val="9BBB59"/>
       </a:accent3>
       <a:accent4>
-        <a:srgbClr val="10CF9B"/>
+        <a:srgbClr val="8064A2"/>
       </a:accent4>
       <a:accent5>
-        <a:srgbClr val="7CCA62"/>
+        <a:srgbClr val="4BACC6"/>
       </a:accent5>
       <a:accent6>
-        <a:srgbClr val="A5C249"/>
+        <a:srgbClr val="F79646"/>
       </a:accent6>
       <a:hlink>
-        <a:srgbClr val="F49100"/>
+        <a:srgbClr val="0000FF"/>
       </a:hlink>
       <a:folHlink>
-        <a:srgbClr val="85DFD0"/>
+        <a:srgbClr val="800080"/>
       </a:folHlink>
     </a:clrScheme>
     <a:fontScheme name="Office">

</xml_diff>